<commit_message>
Add slide 40 recursion vs iteration
</commit_message>
<xml_diff>
--- a/curriculum/Unit8/Unit8.pptx
+++ b/curriculum/Unit8/Unit8.pptx
@@ -5,7 +5,7 @@
     <p:sldMasterId id="2147483648" r:id="rId4"/>
   </p:sldMasterIdLst>
   <p:notesMasterIdLst>
-    <p:notesMasterId r:id="rId66"/>
+    <p:notesMasterId r:id="rId67"/>
   </p:notesMasterIdLst>
   <p:sldIdLst>
     <p:sldId id="256" r:id="rId5"/>
@@ -47,28 +47,29 @@
     <p:sldId id="292" r:id="rId41"/>
     <p:sldId id="293" r:id="rId42"/>
     <p:sldId id="294" r:id="rId43"/>
-    <p:sldId id="295" r:id="rId44"/>
-    <p:sldId id="296" r:id="rId45"/>
-    <p:sldId id="297" r:id="rId46"/>
-    <p:sldId id="298" r:id="rId47"/>
-    <p:sldId id="299" r:id="rId48"/>
-    <p:sldId id="300" r:id="rId49"/>
-    <p:sldId id="301" r:id="rId50"/>
-    <p:sldId id="302" r:id="rId51"/>
-    <p:sldId id="303" r:id="rId52"/>
-    <p:sldId id="304" r:id="rId53"/>
-    <p:sldId id="305" r:id="rId54"/>
-    <p:sldId id="306" r:id="rId55"/>
-    <p:sldId id="307" r:id="rId56"/>
-    <p:sldId id="313" r:id="rId57"/>
-    <p:sldId id="314" r:id="rId58"/>
-    <p:sldId id="315" r:id="rId59"/>
-    <p:sldId id="316" r:id="rId60"/>
-    <p:sldId id="308" r:id="rId61"/>
-    <p:sldId id="309" r:id="rId62"/>
-    <p:sldId id="310" r:id="rId63"/>
-    <p:sldId id="311" r:id="rId64"/>
-    <p:sldId id="312" r:id="rId65"/>
+    <p:sldId id="317" r:id="rId44"/>
+    <p:sldId id="295" r:id="rId45"/>
+    <p:sldId id="296" r:id="rId46"/>
+    <p:sldId id="297" r:id="rId47"/>
+    <p:sldId id="298" r:id="rId48"/>
+    <p:sldId id="299" r:id="rId49"/>
+    <p:sldId id="300" r:id="rId50"/>
+    <p:sldId id="301" r:id="rId51"/>
+    <p:sldId id="302" r:id="rId52"/>
+    <p:sldId id="303" r:id="rId53"/>
+    <p:sldId id="304" r:id="rId54"/>
+    <p:sldId id="305" r:id="rId55"/>
+    <p:sldId id="306" r:id="rId56"/>
+    <p:sldId id="307" r:id="rId57"/>
+    <p:sldId id="313" r:id="rId58"/>
+    <p:sldId id="314" r:id="rId59"/>
+    <p:sldId id="315" r:id="rId60"/>
+    <p:sldId id="316" r:id="rId61"/>
+    <p:sldId id="308" r:id="rId62"/>
+    <p:sldId id="309" r:id="rId63"/>
+    <p:sldId id="310" r:id="rId64"/>
+    <p:sldId id="311" r:id="rId65"/>
+    <p:sldId id="312" r:id="rId66"/>
   </p:sldIdLst>
   <p:sldSz cx="12192000" cy="6858000"/>
   <p:notesSz cx="6858000" cy="9144000"/>
@@ -268,7 +269,7 @@
           <a:p>
             <a:fld id="{AD62BF17-CBD8-4789-9F5F-9C8C99AF67D7}" type="datetimeFigureOut">
               <a:rPr lang="en-US" smtClean="0"/>
-              <a:t>12/12/2016</a:t>
+              <a:t>11/7/2019</a:t>
             </a:fld>
             <a:endParaRPr lang="en-US"/>
           </a:p>
@@ -936,7 +937,7 @@
           <a:p>
             <a:fld id="{C56969A0-B3EA-45A4-A390-44554200A62E}" type="slidenum">
               <a:rPr lang="en-US" smtClean="0"/>
-              <a:t>43</a:t>
+              <a:t>44</a:t>
             </a:fld>
             <a:endParaRPr lang="en-US"/>
           </a:p>
@@ -1023,7 +1024,7 @@
           <a:p>
             <a:fld id="{C56969A0-B3EA-45A4-A390-44554200A62E}" type="slidenum">
               <a:rPr lang="en-US" smtClean="0"/>
-              <a:t>47</a:t>
+              <a:t>48</a:t>
             </a:fld>
             <a:endParaRPr lang="en-US"/>
           </a:p>
@@ -1119,7 +1120,7 @@
           <a:p>
             <a:fld id="{C56969A0-B3EA-45A4-A390-44554200A62E}" type="slidenum">
               <a:rPr lang="en-US" smtClean="0"/>
-              <a:t>53</a:t>
+              <a:t>54</a:t>
             </a:fld>
             <a:endParaRPr lang="en-US"/>
           </a:p>
@@ -1203,7 +1204,7 @@
           <a:p>
             <a:fld id="{C56969A0-B3EA-45A4-A390-44554200A62E}" type="slidenum">
               <a:rPr lang="en-US" smtClean="0"/>
-              <a:t>57</a:t>
+              <a:t>58</a:t>
             </a:fld>
             <a:endParaRPr lang="en-US"/>
           </a:p>
@@ -1351,7 +1352,7 @@
           <a:p>
             <a:fld id="{26115A75-4878-40AF-9D9D-2F737F6775A7}" type="datetimeFigureOut">
               <a:rPr lang="en-US" smtClean="0"/>
-              <a:t>12/12/2016</a:t>
+              <a:t>11/7/2019</a:t>
             </a:fld>
             <a:endParaRPr lang="en-US"/>
           </a:p>
@@ -1519,7 +1520,7 @@
           <a:p>
             <a:fld id="{26115A75-4878-40AF-9D9D-2F737F6775A7}" type="datetimeFigureOut">
               <a:rPr lang="en-US" smtClean="0"/>
-              <a:t>12/12/2016</a:t>
+              <a:t>11/7/2019</a:t>
             </a:fld>
             <a:endParaRPr lang="en-US"/>
           </a:p>
@@ -1697,7 +1698,7 @@
           <a:p>
             <a:fld id="{26115A75-4878-40AF-9D9D-2F737F6775A7}" type="datetimeFigureOut">
               <a:rPr lang="en-US" smtClean="0"/>
-              <a:t>12/12/2016</a:t>
+              <a:t>11/7/2019</a:t>
             </a:fld>
             <a:endParaRPr lang="en-US"/>
           </a:p>
@@ -1865,7 +1866,7 @@
           <a:p>
             <a:fld id="{26115A75-4878-40AF-9D9D-2F737F6775A7}" type="datetimeFigureOut">
               <a:rPr lang="en-US" smtClean="0"/>
-              <a:t>12/12/2016</a:t>
+              <a:t>11/7/2019</a:t>
             </a:fld>
             <a:endParaRPr lang="en-US"/>
           </a:p>
@@ -2110,7 +2111,7 @@
           <a:p>
             <a:fld id="{26115A75-4878-40AF-9D9D-2F737F6775A7}" type="datetimeFigureOut">
               <a:rPr lang="en-US" smtClean="0"/>
-              <a:t>12/12/2016</a:t>
+              <a:t>11/7/2019</a:t>
             </a:fld>
             <a:endParaRPr lang="en-US"/>
           </a:p>
@@ -2339,7 +2340,7 @@
           <a:p>
             <a:fld id="{26115A75-4878-40AF-9D9D-2F737F6775A7}" type="datetimeFigureOut">
               <a:rPr lang="en-US" smtClean="0"/>
-              <a:t>12/12/2016</a:t>
+              <a:t>11/7/2019</a:t>
             </a:fld>
             <a:endParaRPr lang="en-US"/>
           </a:p>
@@ -2703,7 +2704,7 @@
           <a:p>
             <a:fld id="{26115A75-4878-40AF-9D9D-2F737F6775A7}" type="datetimeFigureOut">
               <a:rPr lang="en-US" smtClean="0"/>
-              <a:t>12/12/2016</a:t>
+              <a:t>11/7/2019</a:t>
             </a:fld>
             <a:endParaRPr lang="en-US"/>
           </a:p>
@@ -2820,7 +2821,7 @@
           <a:p>
             <a:fld id="{26115A75-4878-40AF-9D9D-2F737F6775A7}" type="datetimeFigureOut">
               <a:rPr lang="en-US" smtClean="0"/>
-              <a:t>12/12/2016</a:t>
+              <a:t>11/7/2019</a:t>
             </a:fld>
             <a:endParaRPr lang="en-US"/>
           </a:p>
@@ -2915,7 +2916,7 @@
           <a:p>
             <a:fld id="{26115A75-4878-40AF-9D9D-2F737F6775A7}" type="datetimeFigureOut">
               <a:rPr lang="en-US" smtClean="0"/>
-              <a:t>12/12/2016</a:t>
+              <a:t>11/7/2019</a:t>
             </a:fld>
             <a:endParaRPr lang="en-US"/>
           </a:p>
@@ -3190,7 +3191,7 @@
           <a:p>
             <a:fld id="{26115A75-4878-40AF-9D9D-2F737F6775A7}" type="datetimeFigureOut">
               <a:rPr lang="en-US" smtClean="0"/>
-              <a:t>12/12/2016</a:t>
+              <a:t>11/7/2019</a:t>
             </a:fld>
             <a:endParaRPr lang="en-US"/>
           </a:p>
@@ -3442,7 +3443,7 @@
           <a:p>
             <a:fld id="{26115A75-4878-40AF-9D9D-2F737F6775A7}" type="datetimeFigureOut">
               <a:rPr lang="en-US" smtClean="0"/>
-              <a:t>12/12/2016</a:t>
+              <a:t>11/7/2019</a:t>
             </a:fld>
             <a:endParaRPr lang="en-US"/>
           </a:p>
@@ -3653,7 +3654,7 @@
           <a:p>
             <a:fld id="{26115A75-4878-40AF-9D9D-2F737F6775A7}" type="datetimeFigureOut">
               <a:rPr lang="en-US" smtClean="0"/>
-              <a:t>12/12/2016</a:t>
+              <a:t>11/7/2019</a:t>
             </a:fld>
             <a:endParaRPr lang="en-US"/>
           </a:p>
@@ -6972,6 +6973,37 @@
               <a:buNone/>
             </a:pPr>
             <a:r>
+              <a:rPr lang="en-US" sz="1800" dirty="0">
+                <a:latin typeface="Courier New" panose="02070309020205020404" pitchFamily="49" charset="0"/>
+                <a:cs typeface="Courier New" panose="02070309020205020404" pitchFamily="49" charset="0"/>
+              </a:rPr>
+              <a:t>int factorial(int n){			int factorial(int n){</a:t>
+            </a:r>
+          </a:p>
+          <a:p>
+            <a:pPr marL="0" indent="0">
+              <a:buNone/>
+            </a:pPr>
+            <a:r>
+              <a:rPr lang="en-US" sz="1800" dirty="0">
+                <a:latin typeface="Courier New" panose="02070309020205020404" pitchFamily="49" charset="0"/>
+                <a:cs typeface="Courier New" panose="02070309020205020404" pitchFamily="49" charset="0"/>
+              </a:rPr>
+              <a:t>	if (n == 1){					int product = 1;</a:t>
+            </a:r>
+          </a:p>
+          <a:p>
+            <a:pPr marL="0" indent="0">
+              <a:buNone/>
+            </a:pPr>
+            <a:r>
+              <a:rPr lang="en-US" sz="1800" dirty="0">
+                <a:latin typeface="Courier New" panose="02070309020205020404" pitchFamily="49" charset="0"/>
+                <a:cs typeface="Courier New" panose="02070309020205020404" pitchFamily="49" charset="0"/>
+              </a:rPr>
+              <a:t>		return 1;				for (</a:t>
+            </a:r>
+            <a:r>
               <a:rPr lang="en-US" sz="1800" dirty="0" err="1">
                 <a:latin typeface="Courier New" panose="02070309020205020404" pitchFamily="49" charset="0"/>
                 <a:cs typeface="Courier New" panose="02070309020205020404" pitchFamily="49" charset="0"/>
@@ -6983,100 +7015,6 @@
                 <a:latin typeface="Courier New" panose="02070309020205020404" pitchFamily="49" charset="0"/>
                 <a:cs typeface="Courier New" panose="02070309020205020404" pitchFamily="49" charset="0"/>
               </a:rPr>
-              <a:t> factorial(</a:t>
-            </a:r>
-            <a:r>
-              <a:rPr lang="en-US" sz="1800" dirty="0" err="1">
-                <a:latin typeface="Courier New" panose="02070309020205020404" pitchFamily="49" charset="0"/>
-                <a:cs typeface="Courier New" panose="02070309020205020404" pitchFamily="49" charset="0"/>
-              </a:rPr>
-              <a:t>int</a:t>
-            </a:r>
-            <a:r>
-              <a:rPr lang="en-US" sz="1800" dirty="0">
-                <a:latin typeface="Courier New" panose="02070309020205020404" pitchFamily="49" charset="0"/>
-                <a:cs typeface="Courier New" panose="02070309020205020404" pitchFamily="49" charset="0"/>
-              </a:rPr>
-              <a:t> n){				</a:t>
-            </a:r>
-            <a:r>
-              <a:rPr lang="en-US" sz="1800" dirty="0" err="1">
-                <a:latin typeface="Courier New" panose="02070309020205020404" pitchFamily="49" charset="0"/>
-                <a:cs typeface="Courier New" panose="02070309020205020404" pitchFamily="49" charset="0"/>
-              </a:rPr>
-              <a:t>int</a:t>
-            </a:r>
-            <a:r>
-              <a:rPr lang="en-US" sz="1800" dirty="0">
-                <a:latin typeface="Courier New" panose="02070309020205020404" pitchFamily="49" charset="0"/>
-                <a:cs typeface="Courier New" panose="02070309020205020404" pitchFamily="49" charset="0"/>
-              </a:rPr>
-              <a:t> factorial(</a:t>
-            </a:r>
-            <a:r>
-              <a:rPr lang="en-US" sz="1800" dirty="0" err="1">
-                <a:latin typeface="Courier New" panose="02070309020205020404" pitchFamily="49" charset="0"/>
-                <a:cs typeface="Courier New" panose="02070309020205020404" pitchFamily="49" charset="0"/>
-              </a:rPr>
-              <a:t>int</a:t>
-            </a:r>
-            <a:r>
-              <a:rPr lang="en-US" sz="1800" dirty="0">
-                <a:latin typeface="Courier New" panose="02070309020205020404" pitchFamily="49" charset="0"/>
-                <a:cs typeface="Courier New" panose="02070309020205020404" pitchFamily="49" charset="0"/>
-              </a:rPr>
-              <a:t> n){</a:t>
-            </a:r>
-          </a:p>
-          <a:p>
-            <a:pPr marL="0" indent="0">
-              <a:buNone/>
-            </a:pPr>
-            <a:r>
-              <a:rPr lang="en-US" sz="1800" dirty="0">
-                <a:latin typeface="Courier New" panose="02070309020205020404" pitchFamily="49" charset="0"/>
-                <a:cs typeface="Courier New" panose="02070309020205020404" pitchFamily="49" charset="0"/>
-              </a:rPr>
-              <a:t>	if (n == 1){				</a:t>
-            </a:r>
-            <a:r>
-              <a:rPr lang="en-US" sz="1800" dirty="0" err="1">
-                <a:latin typeface="Courier New" panose="02070309020205020404" pitchFamily="49" charset="0"/>
-                <a:cs typeface="Courier New" panose="02070309020205020404" pitchFamily="49" charset="0"/>
-              </a:rPr>
-              <a:t>int</a:t>
-            </a:r>
-            <a:r>
-              <a:rPr lang="en-US" sz="1800" dirty="0">
-                <a:latin typeface="Courier New" panose="02070309020205020404" pitchFamily="49" charset="0"/>
-                <a:cs typeface="Courier New" panose="02070309020205020404" pitchFamily="49" charset="0"/>
-              </a:rPr>
-              <a:t> product = 1;</a:t>
-            </a:r>
-          </a:p>
-          <a:p>
-            <a:pPr marL="0" indent="0">
-              <a:buNone/>
-            </a:pPr>
-            <a:r>
-              <a:rPr lang="en-US" sz="1800" dirty="0">
-                <a:latin typeface="Courier New" panose="02070309020205020404" pitchFamily="49" charset="0"/>
-                <a:cs typeface="Courier New" panose="02070309020205020404" pitchFamily="49" charset="0"/>
-              </a:rPr>
-              <a:t>		return 1;				for (</a:t>
-            </a:r>
-            <a:r>
-              <a:rPr lang="en-US" sz="1800" dirty="0" err="1">
-                <a:latin typeface="Courier New" panose="02070309020205020404" pitchFamily="49" charset="0"/>
-                <a:cs typeface="Courier New" panose="02070309020205020404" pitchFamily="49" charset="0"/>
-              </a:rPr>
-              <a:t>int</a:t>
-            </a:r>
-            <a:r>
-              <a:rPr lang="en-US" sz="1800" dirty="0">
-                <a:latin typeface="Courier New" panose="02070309020205020404" pitchFamily="49" charset="0"/>
-                <a:cs typeface="Courier New" panose="02070309020205020404" pitchFamily="49" charset="0"/>
-              </a:rPr>
               <a:t> </a:t>
             </a:r>
             <a:r>
@@ -7131,33 +7069,19 @@
                 <a:latin typeface="Courier New" panose="02070309020205020404" pitchFamily="49" charset="0"/>
                 <a:cs typeface="Courier New" panose="02070309020205020404" pitchFamily="49" charset="0"/>
               </a:rPr>
-              <a:t>	}else{						product *= </a:t>
-            </a:r>
-            <a:r>
-              <a:rPr lang="en-US" sz="1800" dirty="0" err="1">
-                <a:latin typeface="Courier New" panose="02070309020205020404" pitchFamily="49" charset="0"/>
-                <a:cs typeface="Courier New" panose="02070309020205020404" pitchFamily="49" charset="0"/>
-              </a:rPr>
-              <a:t>i</a:t>
-            </a:r>
+              <a:t>	}else{							product *= i;</a:t>
+            </a:r>
+          </a:p>
+          <a:p>
+            <a:pPr marL="0" indent="0">
+              <a:buNone/>
+            </a:pPr>
             <a:r>
               <a:rPr lang="en-US" sz="1800" dirty="0">
                 <a:latin typeface="Courier New" panose="02070309020205020404" pitchFamily="49" charset="0"/>
                 <a:cs typeface="Courier New" panose="02070309020205020404" pitchFamily="49" charset="0"/>
               </a:rPr>
-              <a:t>;</a:t>
-            </a:r>
-          </a:p>
-          <a:p>
-            <a:pPr marL="0" indent="0">
-              <a:buNone/>
-            </a:pPr>
-            <a:r>
-              <a:rPr lang="en-US" sz="1800" dirty="0">
-                <a:latin typeface="Courier New" panose="02070309020205020404" pitchFamily="49" charset="0"/>
-                <a:cs typeface="Courier New" panose="02070309020205020404" pitchFamily="49" charset="0"/>
-              </a:rPr>
-              <a:t>		return n*factorial(n-1);	}</a:t>
+              <a:t>		return n*factorial(n-1);		}</a:t>
             </a:r>
           </a:p>
           <a:p>
@@ -7302,6 +7226,143 @@
           <a:p>
             <a:r>
               <a:rPr lang="en-US" dirty="0"/>
+              <a:t>Iterative vs Recursive</a:t>
+            </a:r>
+          </a:p>
+        </p:txBody>
+      </p:sp>
+      <p:sp>
+        <p:nvSpPr>
+          <p:cNvPr id="3" name="Content Placeholder 2"/>
+          <p:cNvSpPr>
+            <a:spLocks noGrp="1"/>
+          </p:cNvSpPr>
+          <p:nvPr>
+            <p:ph idx="1"/>
+          </p:nvPr>
+        </p:nvSpPr>
+        <p:spPr>
+          <a:xfrm>
+            <a:off x="838199" y="1825625"/>
+            <a:ext cx="10601739" cy="4351338"/>
+          </a:xfrm>
+        </p:spPr>
+        <p:txBody>
+          <a:bodyPr>
+            <a:normAutofit/>
+          </a:bodyPr>
+          <a:lstStyle/>
+          <a:p>
+            <a:pPr marL="0" indent="0">
+              <a:buNone/>
+            </a:pPr>
+            <a:r>
+              <a:rPr lang="en-US" dirty="0"/>
+              <a:t>Recursion can be used to traverse String, array, and </a:t>
+            </a:r>
+            <a:r>
+              <a:rPr lang="en-US" dirty="0" err="1"/>
+              <a:t>ArrayList</a:t>
+            </a:r>
+            <a:r>
+              <a:rPr lang="en-US" dirty="0"/>
+              <a:t> objects, much like a loop</a:t>
+            </a:r>
+          </a:p>
+          <a:p>
+            <a:pPr marL="0" indent="0">
+              <a:buNone/>
+            </a:pPr>
+            <a:r>
+              <a:rPr lang="en-US" dirty="0"/>
+              <a:t>Any recursive solution could be written with iteration (loops) instead</a:t>
+            </a:r>
+          </a:p>
+          <a:p>
+            <a:pPr marL="0" indent="0">
+              <a:buNone/>
+            </a:pPr>
+            <a:r>
+              <a:rPr lang="en-US" dirty="0"/>
+              <a:t>Some algorithms are easier to solve recursively, like </a:t>
+            </a:r>
+            <a:r>
+              <a:rPr lang="en-US"/>
+              <a:t>traversing trees</a:t>
+            </a:r>
+            <a:endParaRPr lang="en-US" dirty="0"/>
+          </a:p>
+          <a:p>
+            <a:pPr marL="0" indent="0">
+              <a:buNone/>
+            </a:pPr>
+            <a:r>
+              <a:rPr lang="en-US" dirty="0"/>
+              <a:t>In general recursive solutions are more resource intensive than iteration</a:t>
+            </a:r>
+            <a:endParaRPr lang="en-US" sz="1800" dirty="0">
+              <a:latin typeface="Courier New" panose="02070309020205020404" pitchFamily="49" charset="0"/>
+              <a:cs typeface="Courier New" panose="02070309020205020404" pitchFamily="49" charset="0"/>
+            </a:endParaRPr>
+          </a:p>
+          <a:p>
+            <a:pPr marL="0" indent="0">
+              <a:buNone/>
+            </a:pPr>
+            <a:endParaRPr lang="en-US" sz="1800" dirty="0">
+              <a:latin typeface="Courier New" panose="02070309020205020404" pitchFamily="49" charset="0"/>
+              <a:cs typeface="Courier New" panose="02070309020205020404" pitchFamily="49" charset="0"/>
+            </a:endParaRPr>
+          </a:p>
+        </p:txBody>
+      </p:sp>
+    </p:spTree>
+    <p:extLst>
+      <p:ext uri="{BB962C8B-B14F-4D97-AF65-F5344CB8AC3E}">
+        <p14:creationId xmlns:p14="http://schemas.microsoft.com/office/powerpoint/2010/main" val="3693634366"/>
+      </p:ext>
+    </p:extLst>
+  </p:cSld>
+  <p:clrMapOvr>
+    <a:masterClrMapping/>
+  </p:clrMapOvr>
+</p:sld>
+</file>
+
+<file path=ppt/slides/slide41.xml><?xml version="1.0" encoding="utf-8"?>
+<p:sld xmlns:a="http://schemas.openxmlformats.org/drawingml/2006/main" xmlns:r="http://schemas.openxmlformats.org/officeDocument/2006/relationships" xmlns:p="http://schemas.openxmlformats.org/presentationml/2006/main">
+  <p:cSld>
+    <p:spTree>
+      <p:nvGrpSpPr>
+        <p:cNvPr id="1" name=""/>
+        <p:cNvGrpSpPr/>
+        <p:nvPr/>
+      </p:nvGrpSpPr>
+      <p:grpSpPr>
+        <a:xfrm>
+          <a:off x="0" y="0"/>
+          <a:ext cx="0" cy="0"/>
+          <a:chOff x="0" y="0"/>
+          <a:chExt cx="0" cy="0"/>
+        </a:xfrm>
+      </p:grpSpPr>
+      <p:sp>
+        <p:nvSpPr>
+          <p:cNvPr id="2" name="Title 1"/>
+          <p:cNvSpPr>
+            <a:spLocks noGrp="1"/>
+          </p:cNvSpPr>
+          <p:nvPr>
+            <p:ph type="title"/>
+          </p:nvPr>
+        </p:nvSpPr>
+        <p:spPr/>
+        <p:txBody>
+          <a:bodyPr/>
+          <a:lstStyle/>
+          <a:p>
+            <a:r>
+              <a:rPr lang="en-US" dirty="0"/>
               <a:t>Koch Curve</a:t>
             </a:r>
           </a:p>
@@ -7397,7 +7458,7 @@
 </p:sld>
 </file>
 
-<file path=ppt/slides/slide41.xml><?xml version="1.0" encoding="utf-8"?>
+<file path=ppt/slides/slide42.xml><?xml version="1.0" encoding="utf-8"?>
 <p:sld xmlns:a="http://schemas.openxmlformats.org/drawingml/2006/main" xmlns:r="http://schemas.openxmlformats.org/officeDocument/2006/relationships" xmlns:p="http://schemas.openxmlformats.org/presentationml/2006/main">
   <p:cSld>
     <p:spTree>
@@ -7544,85 +7605,6 @@
 </p:sld>
 </file>
 
-<file path=ppt/slides/slide42.xml><?xml version="1.0" encoding="utf-8"?>
-<p:sld xmlns:a="http://schemas.openxmlformats.org/drawingml/2006/main" xmlns:r="http://schemas.openxmlformats.org/officeDocument/2006/relationships" xmlns:p="http://schemas.openxmlformats.org/presentationml/2006/main">
-  <p:cSld>
-    <p:spTree>
-      <p:nvGrpSpPr>
-        <p:cNvPr id="1" name=""/>
-        <p:cNvGrpSpPr/>
-        <p:nvPr/>
-      </p:nvGrpSpPr>
-      <p:grpSpPr>
-        <a:xfrm>
-          <a:off x="0" y="0"/>
-          <a:ext cx="0" cy="0"/>
-          <a:chOff x="0" y="0"/>
-          <a:chExt cx="0" cy="0"/>
-        </a:xfrm>
-      </p:grpSpPr>
-      <p:sp>
-        <p:nvSpPr>
-          <p:cNvPr id="2" name="Title 1"/>
-          <p:cNvSpPr>
-            <a:spLocks noGrp="1"/>
-          </p:cNvSpPr>
-          <p:nvPr>
-            <p:ph type="title"/>
-          </p:nvPr>
-        </p:nvSpPr>
-        <p:spPr/>
-        <p:txBody>
-          <a:bodyPr>
-            <a:normAutofit/>
-          </a:bodyPr>
-          <a:lstStyle/>
-          <a:p>
-            <a:r>
-              <a:rPr lang="en-US" dirty="0"/>
-              <a:t>Homework</a:t>
-            </a:r>
-          </a:p>
-        </p:txBody>
-      </p:sp>
-      <p:sp>
-        <p:nvSpPr>
-          <p:cNvPr id="3" name="Content Placeholder 2"/>
-          <p:cNvSpPr>
-            <a:spLocks noGrp="1"/>
-          </p:cNvSpPr>
-          <p:nvPr>
-            <p:ph idx="1"/>
-          </p:nvPr>
-        </p:nvSpPr>
-        <p:spPr/>
-        <p:txBody>
-          <a:bodyPr/>
-          <a:lstStyle/>
-          <a:p>
-            <a:pPr marL="0" indent="0">
-              <a:buNone/>
-            </a:pPr>
-            <a:r>
-              <a:rPr lang="en-US" dirty="0"/>
-              <a:t>Complete self-check #6, 10, and exercise #3</a:t>
-            </a:r>
-          </a:p>
-        </p:txBody>
-      </p:sp>
-    </p:spTree>
-    <p:extLst>
-      <p:ext uri="{BB962C8B-B14F-4D97-AF65-F5344CB8AC3E}">
-        <p14:creationId xmlns:p14="http://schemas.microsoft.com/office/powerpoint/2010/main" val="2574879785"/>
-      </p:ext>
-    </p:extLst>
-  </p:cSld>
-  <p:clrMapOvr>
-    <a:masterClrMapping/>
-  </p:clrMapOvr>
-</p:sld>
-</file>
-
 <file path=ppt/slides/slide43.xml><?xml version="1.0" encoding="utf-8"?>
 <p:sld xmlns:a="http://schemas.openxmlformats.org/drawingml/2006/main" xmlns:r="http://schemas.openxmlformats.org/officeDocument/2006/relationships" xmlns:p="http://schemas.openxmlformats.org/presentationml/2006/main">
   <p:cSld>
@@ -7647,39 +7629,44 @@
             <a:spLocks noGrp="1"/>
           </p:cNvSpPr>
           <p:nvPr>
-            <p:ph type="ctrTitle"/>
+            <p:ph type="title"/>
           </p:nvPr>
         </p:nvSpPr>
         <p:spPr/>
         <p:txBody>
+          <a:bodyPr>
+            <a:normAutofit/>
+          </a:bodyPr>
+          <a:lstStyle/>
+          <a:p>
+            <a:r>
+              <a:rPr lang="en-US" dirty="0"/>
+              <a:t>Homework</a:t>
+            </a:r>
+          </a:p>
+        </p:txBody>
+      </p:sp>
+      <p:sp>
+        <p:nvSpPr>
+          <p:cNvPr id="3" name="Content Placeholder 2"/>
+          <p:cNvSpPr>
+            <a:spLocks noGrp="1"/>
+          </p:cNvSpPr>
+          <p:nvPr>
+            <p:ph idx="1"/>
+          </p:nvPr>
+        </p:nvSpPr>
+        <p:spPr/>
+        <p:txBody>
           <a:bodyPr/>
           <a:lstStyle/>
           <a:p>
+            <a:pPr marL="0" indent="0">
+              <a:buNone/>
+            </a:pPr>
             <a:r>
               <a:rPr lang="en-US" dirty="0"/>
-              <a:t>Merge Sort</a:t>
-            </a:r>
-          </a:p>
-        </p:txBody>
-      </p:sp>
-      <p:sp>
-        <p:nvSpPr>
-          <p:cNvPr id="3" name="Subtitle 2"/>
-          <p:cNvSpPr>
-            <a:spLocks noGrp="1"/>
-          </p:cNvSpPr>
-          <p:nvPr>
-            <p:ph type="subTitle" idx="1"/>
-          </p:nvPr>
-        </p:nvSpPr>
-        <p:spPr/>
-        <p:txBody>
-          <a:bodyPr/>
-          <a:lstStyle/>
-          <a:p>
-            <a:r>
-              <a:rPr lang="en-US" dirty="0"/>
-              <a:t>[ 8.04 ] [ Today’s Date ] [ Instructor Name ]</a:t>
+              <a:t>Complete self-check #6, 10, and exercise #3</a:t>
             </a:r>
           </a:p>
         </p:txBody>
@@ -7687,7 +7674,7 @@
     </p:spTree>
     <p:extLst>
       <p:ext uri="{BB962C8B-B14F-4D97-AF65-F5344CB8AC3E}">
-        <p14:creationId xmlns:p14="http://schemas.microsoft.com/office/powerpoint/2010/main" val="3942927879"/>
+        <p14:creationId xmlns:p14="http://schemas.microsoft.com/office/powerpoint/2010/main" val="2574879785"/>
       </p:ext>
     </p:extLst>
   </p:cSld>
@@ -7721,6 +7708,80 @@
             <a:spLocks noGrp="1"/>
           </p:cNvSpPr>
           <p:nvPr>
+            <p:ph type="ctrTitle"/>
+          </p:nvPr>
+        </p:nvSpPr>
+        <p:spPr/>
+        <p:txBody>
+          <a:bodyPr/>
+          <a:lstStyle/>
+          <a:p>
+            <a:r>
+              <a:rPr lang="en-US" dirty="0"/>
+              <a:t>Merge Sort</a:t>
+            </a:r>
+          </a:p>
+        </p:txBody>
+      </p:sp>
+      <p:sp>
+        <p:nvSpPr>
+          <p:cNvPr id="3" name="Subtitle 2"/>
+          <p:cNvSpPr>
+            <a:spLocks noGrp="1"/>
+          </p:cNvSpPr>
+          <p:nvPr>
+            <p:ph type="subTitle" idx="1"/>
+          </p:nvPr>
+        </p:nvSpPr>
+        <p:spPr/>
+        <p:txBody>
+          <a:bodyPr/>
+          <a:lstStyle/>
+          <a:p>
+            <a:r>
+              <a:rPr lang="en-US" dirty="0"/>
+              <a:t>[ 8.04 ] [ Today’s Date ] [ Instructor Name ]</a:t>
+            </a:r>
+          </a:p>
+        </p:txBody>
+      </p:sp>
+    </p:spTree>
+    <p:extLst>
+      <p:ext uri="{BB962C8B-B14F-4D97-AF65-F5344CB8AC3E}">
+        <p14:creationId xmlns:p14="http://schemas.microsoft.com/office/powerpoint/2010/main" val="3942927879"/>
+      </p:ext>
+    </p:extLst>
+  </p:cSld>
+  <p:clrMapOvr>
+    <a:masterClrMapping/>
+  </p:clrMapOvr>
+</p:sld>
+</file>
+
+<file path=ppt/slides/slide45.xml><?xml version="1.0" encoding="utf-8"?>
+<p:sld xmlns:a="http://schemas.openxmlformats.org/drawingml/2006/main" xmlns:r="http://schemas.openxmlformats.org/officeDocument/2006/relationships" xmlns:p="http://schemas.openxmlformats.org/presentationml/2006/main">
+  <p:cSld>
+    <p:spTree>
+      <p:nvGrpSpPr>
+        <p:cNvPr id="1" name=""/>
+        <p:cNvGrpSpPr/>
+        <p:nvPr/>
+      </p:nvGrpSpPr>
+      <p:grpSpPr>
+        <a:xfrm>
+          <a:off x="0" y="0"/>
+          <a:ext cx="0" cy="0"/>
+          <a:chOff x="0" y="0"/>
+          <a:chExt cx="0" cy="0"/>
+        </a:xfrm>
+      </p:grpSpPr>
+      <p:sp>
+        <p:nvSpPr>
+          <p:cNvPr id="2" name="Title 1"/>
+          <p:cNvSpPr>
+            <a:spLocks noGrp="1"/>
+          </p:cNvSpPr>
+          <p:nvPr>
             <p:ph type="title"/>
           </p:nvPr>
         </p:nvSpPr>
@@ -7795,7 +7856,7 @@
 </p:sld>
 </file>
 
-<file path=ppt/slides/slide45.xml><?xml version="1.0" encoding="utf-8"?>
+<file path=ppt/slides/slide46.xml><?xml version="1.0" encoding="utf-8"?>
 <p:sld xmlns:a="http://schemas.openxmlformats.org/drawingml/2006/main" xmlns:r="http://schemas.openxmlformats.org/officeDocument/2006/relationships" xmlns:p="http://schemas.openxmlformats.org/presentationml/2006/main">
   <p:cSld>
     <p:spTree>
@@ -7896,7 +7957,7 @@
 </p:sld>
 </file>
 
-<file path=ppt/slides/slide46.xml><?xml version="1.0" encoding="utf-8"?>
+<file path=ppt/slides/slide47.xml><?xml version="1.0" encoding="utf-8"?>
 <p:sld xmlns:a="http://schemas.openxmlformats.org/drawingml/2006/main" xmlns:r="http://schemas.openxmlformats.org/officeDocument/2006/relationships" xmlns:p="http://schemas.openxmlformats.org/presentationml/2006/main">
   <p:cSld>
     <p:spTree>
@@ -7995,7 +8056,7 @@
 </p:sld>
 </file>
 
-<file path=ppt/slides/slide47.xml><?xml version="1.0" encoding="utf-8"?>
+<file path=ppt/slides/slide48.xml><?xml version="1.0" encoding="utf-8"?>
 <p:sld xmlns:a="http://schemas.openxmlformats.org/drawingml/2006/main" xmlns:r="http://schemas.openxmlformats.org/officeDocument/2006/relationships" xmlns:p="http://schemas.openxmlformats.org/presentationml/2006/main">
   <p:cSld>
     <p:spTree>
@@ -8279,7 +8340,7 @@
 </p:sld>
 </file>
 
-<file path=ppt/slides/slide48.xml><?xml version="1.0" encoding="utf-8"?>
+<file path=ppt/slides/slide49.xml><?xml version="1.0" encoding="utf-8"?>
 <p:sld xmlns:a="http://schemas.openxmlformats.org/drawingml/2006/main" xmlns:r="http://schemas.openxmlformats.org/officeDocument/2006/relationships" xmlns:p="http://schemas.openxmlformats.org/presentationml/2006/main">
   <p:cSld>
     <p:spTree>
@@ -8388,9 +8449,7 @@
           <p:cNvGraphicFramePr>
             <a:graphicFrameLocks noGrp="1"/>
           </p:cNvGraphicFramePr>
-          <p:nvPr>
-            <p:extLst/>
-          </p:nvPr>
+          <p:nvPr/>
         </p:nvGraphicFramePr>
         <p:xfrm>
           <a:off x="9171957" y="1783149"/>
@@ -8713,9 +8772,7 @@
           <p:cNvGraphicFramePr>
             <a:graphicFrameLocks noGrp="1"/>
           </p:cNvGraphicFramePr>
-          <p:nvPr>
-            <p:extLst/>
-          </p:nvPr>
+          <p:nvPr/>
         </p:nvGraphicFramePr>
         <p:xfrm>
           <a:off x="9171957" y="2584342"/>
@@ -9038,9 +9095,7 @@
           <p:cNvGraphicFramePr>
             <a:graphicFrameLocks noGrp="1"/>
           </p:cNvGraphicFramePr>
-          <p:nvPr>
-            <p:extLst/>
-          </p:nvPr>
+          <p:nvPr/>
         </p:nvGraphicFramePr>
         <p:xfrm>
           <a:off x="6879846" y="5646194"/>
@@ -9149,9 +9204,7 @@
           <p:cNvGraphicFramePr>
             <a:graphicFrameLocks noGrp="1"/>
           </p:cNvGraphicFramePr>
-          <p:nvPr>
-            <p:extLst/>
-          </p:nvPr>
+          <p:nvPr/>
         </p:nvGraphicFramePr>
         <p:xfrm>
           <a:off x="7440808" y="5644546"/>
@@ -9255,9 +9308,7 @@
           <p:cNvGraphicFramePr>
             <a:graphicFrameLocks noGrp="1"/>
           </p:cNvGraphicFramePr>
-          <p:nvPr>
-            <p:extLst/>
-          </p:nvPr>
+          <p:nvPr/>
         </p:nvGraphicFramePr>
         <p:xfrm>
           <a:off x="7994974" y="5646194"/>
@@ -9361,9 +9412,7 @@
           <p:cNvGraphicFramePr>
             <a:graphicFrameLocks noGrp="1"/>
           </p:cNvGraphicFramePr>
-          <p:nvPr>
-            <p:extLst/>
-          </p:nvPr>
+          <p:nvPr/>
         </p:nvGraphicFramePr>
         <p:xfrm>
           <a:off x="8555936" y="5644546"/>
@@ -9467,9 +9516,7 @@
           <p:cNvGraphicFramePr>
             <a:graphicFrameLocks noGrp="1"/>
           </p:cNvGraphicFramePr>
-          <p:nvPr>
-            <p:extLst/>
-          </p:nvPr>
+          <p:nvPr/>
         </p:nvGraphicFramePr>
         <p:xfrm>
           <a:off x="9111959" y="5643539"/>
@@ -9573,9 +9620,7 @@
           <p:cNvGraphicFramePr>
             <a:graphicFrameLocks noGrp="1"/>
           </p:cNvGraphicFramePr>
-          <p:nvPr>
-            <p:extLst/>
-          </p:nvPr>
+          <p:nvPr/>
         </p:nvGraphicFramePr>
         <p:xfrm>
           <a:off x="9672921" y="5641891"/>
@@ -9679,9 +9724,7 @@
           <p:cNvGraphicFramePr>
             <a:graphicFrameLocks noGrp="1"/>
           </p:cNvGraphicFramePr>
-          <p:nvPr>
-            <p:extLst/>
-          </p:nvPr>
+          <p:nvPr/>
         </p:nvGraphicFramePr>
         <p:xfrm>
           <a:off x="10227087" y="5643539"/>
@@ -9785,9 +9828,7 @@
           <p:cNvGraphicFramePr>
             <a:graphicFrameLocks noGrp="1"/>
           </p:cNvGraphicFramePr>
-          <p:nvPr>
-            <p:extLst/>
-          </p:nvPr>
+          <p:nvPr/>
         </p:nvGraphicFramePr>
         <p:xfrm>
           <a:off x="10788049" y="5641891"/>
@@ -10555,60 +10596,6 @@
 </p:sld>
 </file>
 
-<file path=ppt/slides/slide49.xml><?xml version="1.0" encoding="utf-8"?>
-<p:sld xmlns:a="http://schemas.openxmlformats.org/drawingml/2006/main" xmlns:r="http://schemas.openxmlformats.org/officeDocument/2006/relationships" xmlns:p="http://schemas.openxmlformats.org/presentationml/2006/main">
-  <p:cSld>
-    <p:spTree>
-      <p:nvGrpSpPr>
-        <p:cNvPr id="1" name=""/>
-        <p:cNvGrpSpPr/>
-        <p:nvPr/>
-      </p:nvGrpSpPr>
-      <p:grpSpPr>
-        <a:xfrm>
-          <a:off x="0" y="0"/>
-          <a:ext cx="0" cy="0"/>
-          <a:chOff x="0" y="0"/>
-          <a:chExt cx="0" cy="0"/>
-        </a:xfrm>
-      </p:grpSpPr>
-      <p:pic>
-        <p:nvPicPr>
-          <p:cNvPr id="4" name="Picture 3"/>
-          <p:cNvPicPr>
-            <a:picLocks noChangeAspect="1"/>
-          </p:cNvPicPr>
-          <p:nvPr/>
-        </p:nvPicPr>
-        <p:blipFill>
-          <a:blip r:embed="rId2"/>
-          <a:stretch>
-            <a:fillRect/>
-          </a:stretch>
-        </p:blipFill>
-        <p:spPr>
-          <a:xfrm>
-            <a:off x="1048719" y="180038"/>
-            <a:ext cx="10094562" cy="6497924"/>
-          </a:xfrm>
-          <a:prstGeom prst="rect">
-            <a:avLst/>
-          </a:prstGeom>
-        </p:spPr>
-      </p:pic>
-    </p:spTree>
-    <p:extLst>
-      <p:ext uri="{BB962C8B-B14F-4D97-AF65-F5344CB8AC3E}">
-        <p14:creationId xmlns:p14="http://schemas.microsoft.com/office/powerpoint/2010/main" val="1781572815"/>
-      </p:ext>
-    </p:extLst>
-  </p:cSld>
-  <p:clrMapOvr>
-    <a:masterClrMapping/>
-  </p:clrMapOvr>
-</p:sld>
-</file>
-
 <file path=ppt/slides/slide5.xml><?xml version="1.0" encoding="utf-8"?>
 <p:sld xmlns:a="http://schemas.openxmlformats.org/drawingml/2006/main" xmlns:r="http://schemas.openxmlformats.org/officeDocument/2006/relationships" xmlns:p="http://schemas.openxmlformats.org/presentationml/2006/main">
   <p:cSld>
@@ -10686,6 +10673,60 @@
           <a:chExt cx="0" cy="0"/>
         </a:xfrm>
       </p:grpSpPr>
+      <p:pic>
+        <p:nvPicPr>
+          <p:cNvPr id="4" name="Picture 3"/>
+          <p:cNvPicPr>
+            <a:picLocks noChangeAspect="1"/>
+          </p:cNvPicPr>
+          <p:nvPr/>
+        </p:nvPicPr>
+        <p:blipFill>
+          <a:blip r:embed="rId2"/>
+          <a:stretch>
+            <a:fillRect/>
+          </a:stretch>
+        </p:blipFill>
+        <p:spPr>
+          <a:xfrm>
+            <a:off x="1048719" y="180038"/>
+            <a:ext cx="10094562" cy="6497924"/>
+          </a:xfrm>
+          <a:prstGeom prst="rect">
+            <a:avLst/>
+          </a:prstGeom>
+        </p:spPr>
+      </p:pic>
+    </p:spTree>
+    <p:extLst>
+      <p:ext uri="{BB962C8B-B14F-4D97-AF65-F5344CB8AC3E}">
+        <p14:creationId xmlns:p14="http://schemas.microsoft.com/office/powerpoint/2010/main" val="1781572815"/>
+      </p:ext>
+    </p:extLst>
+  </p:cSld>
+  <p:clrMapOvr>
+    <a:masterClrMapping/>
+  </p:clrMapOvr>
+</p:sld>
+</file>
+
+<file path=ppt/slides/slide51.xml><?xml version="1.0" encoding="utf-8"?>
+<p:sld xmlns:a="http://schemas.openxmlformats.org/drawingml/2006/main" xmlns:r="http://schemas.openxmlformats.org/officeDocument/2006/relationships" xmlns:p="http://schemas.openxmlformats.org/presentationml/2006/main">
+  <p:cSld>
+    <p:spTree>
+      <p:nvGrpSpPr>
+        <p:cNvPr id="1" name=""/>
+        <p:cNvGrpSpPr/>
+        <p:nvPr/>
+      </p:nvGrpSpPr>
+      <p:grpSpPr>
+        <a:xfrm>
+          <a:off x="0" y="0"/>
+          <a:ext cx="0" cy="0"/>
+          <a:chOff x="0" y="0"/>
+          <a:chExt cx="0" cy="0"/>
+        </a:xfrm>
+      </p:grpSpPr>
       <p:sp>
         <p:nvSpPr>
           <p:cNvPr id="2" name="Title 1"/>
@@ -10806,7 +10847,7 @@
 </p:sld>
 </file>
 
-<file path=ppt/slides/slide51.xml><?xml version="1.0" encoding="utf-8"?>
+<file path=ppt/slides/slide52.xml><?xml version="1.0" encoding="utf-8"?>
 <p:sld xmlns:a="http://schemas.openxmlformats.org/drawingml/2006/main" xmlns:r="http://schemas.openxmlformats.org/officeDocument/2006/relationships" xmlns:p="http://schemas.openxmlformats.org/presentationml/2006/main">
   <p:cSld>
     <p:spTree>
@@ -10860,97 +10901,6 @@
 </p:sld>
 </file>
 
-<file path=ppt/slides/slide52.xml><?xml version="1.0" encoding="utf-8"?>
-<p:sld xmlns:a="http://schemas.openxmlformats.org/drawingml/2006/main" xmlns:r="http://schemas.openxmlformats.org/officeDocument/2006/relationships" xmlns:p="http://schemas.openxmlformats.org/presentationml/2006/main">
-  <p:cSld>
-    <p:spTree>
-      <p:nvGrpSpPr>
-        <p:cNvPr id="1" name=""/>
-        <p:cNvGrpSpPr/>
-        <p:nvPr/>
-      </p:nvGrpSpPr>
-      <p:grpSpPr>
-        <a:xfrm>
-          <a:off x="0" y="0"/>
-          <a:ext cx="0" cy="0"/>
-          <a:chOff x="0" y="0"/>
-          <a:chExt cx="0" cy="0"/>
-        </a:xfrm>
-      </p:grpSpPr>
-      <p:sp>
-        <p:nvSpPr>
-          <p:cNvPr id="2" name="Title 1"/>
-          <p:cNvSpPr>
-            <a:spLocks noGrp="1"/>
-          </p:cNvSpPr>
-          <p:nvPr>
-            <p:ph type="title"/>
-          </p:nvPr>
-        </p:nvSpPr>
-        <p:spPr/>
-        <p:txBody>
-          <a:bodyPr>
-            <a:normAutofit/>
-          </a:bodyPr>
-          <a:lstStyle/>
-          <a:p>
-            <a:r>
-              <a:rPr lang="en-US" dirty="0"/>
-              <a:t>Homework</a:t>
-            </a:r>
-          </a:p>
-        </p:txBody>
-      </p:sp>
-      <p:sp>
-        <p:nvSpPr>
-          <p:cNvPr id="3" name="Content Placeholder 2"/>
-          <p:cNvSpPr>
-            <a:spLocks noGrp="1"/>
-          </p:cNvSpPr>
-          <p:nvPr>
-            <p:ph idx="1"/>
-          </p:nvPr>
-        </p:nvSpPr>
-        <p:spPr/>
-        <p:txBody>
-          <a:bodyPr/>
-          <a:lstStyle/>
-          <a:p>
-            <a:pPr marL="0" indent="0">
-              <a:buNone/>
-            </a:pPr>
-            <a:r>
-              <a:rPr lang="en-US" dirty="0"/>
-              <a:t>Summarize notes for notebook check tomorrow.</a:t>
-            </a:r>
-          </a:p>
-          <a:p>
-            <a:pPr marL="0" indent="0">
-              <a:buNone/>
-            </a:pPr>
-            <a:endParaRPr lang="en-US" dirty="0"/>
-          </a:p>
-          <a:p>
-            <a:pPr marL="0" indent="0">
-              <a:buNone/>
-            </a:pPr>
-            <a:endParaRPr lang="en-US" dirty="0"/>
-          </a:p>
-        </p:txBody>
-      </p:sp>
-    </p:spTree>
-    <p:extLst>
-      <p:ext uri="{BB962C8B-B14F-4D97-AF65-F5344CB8AC3E}">
-        <p14:creationId xmlns:p14="http://schemas.microsoft.com/office/powerpoint/2010/main" val="357095890"/>
-      </p:ext>
-    </p:extLst>
-  </p:cSld>
-  <p:clrMapOvr>
-    <a:masterClrMapping/>
-  </p:clrMapOvr>
-</p:sld>
-</file>
-
 <file path=ppt/slides/slide53.xml><?xml version="1.0" encoding="utf-8"?>
 <p:sld xmlns:a="http://schemas.openxmlformats.org/drawingml/2006/main" xmlns:r="http://schemas.openxmlformats.org/officeDocument/2006/relationships" xmlns:p="http://schemas.openxmlformats.org/presentationml/2006/main">
   <p:cSld>
@@ -10975,47 +10925,64 @@
             <a:spLocks noGrp="1"/>
           </p:cNvSpPr>
           <p:nvPr>
-            <p:ph type="ctrTitle"/>
+            <p:ph type="title"/>
           </p:nvPr>
         </p:nvSpPr>
         <p:spPr/>
         <p:txBody>
+          <a:bodyPr>
+            <a:normAutofit/>
+          </a:bodyPr>
+          <a:lstStyle/>
+          <a:p>
+            <a:r>
+              <a:rPr lang="en-US" dirty="0"/>
+              <a:t>Homework</a:t>
+            </a:r>
+          </a:p>
+        </p:txBody>
+      </p:sp>
+      <p:sp>
+        <p:nvSpPr>
+          <p:cNvPr id="3" name="Content Placeholder 2"/>
+          <p:cNvSpPr>
+            <a:spLocks noGrp="1"/>
+          </p:cNvSpPr>
+          <p:nvPr>
+            <p:ph idx="1"/>
+          </p:nvPr>
+        </p:nvSpPr>
+        <p:spPr/>
+        <p:txBody>
           <a:bodyPr/>
           <a:lstStyle/>
           <a:p>
+            <a:pPr marL="0" indent="0">
+              <a:buNone/>
+            </a:pPr>
             <a:r>
               <a:rPr lang="en-US" dirty="0"/>
-              <a:t>Finding and Fixing Errors</a:t>
-            </a:r>
-          </a:p>
-        </p:txBody>
-      </p:sp>
-      <p:sp>
-        <p:nvSpPr>
-          <p:cNvPr id="3" name="Subtitle 2"/>
-          <p:cNvSpPr>
-            <a:spLocks noGrp="1"/>
-          </p:cNvSpPr>
-          <p:nvPr>
-            <p:ph type="subTitle" idx="1"/>
-          </p:nvPr>
-        </p:nvSpPr>
-        <p:spPr/>
-        <p:txBody>
-          <a:bodyPr/>
-          <a:lstStyle/>
-          <a:p>
-            <a:r>
-              <a:rPr lang="en-US" dirty="0"/>
-              <a:t>[ 8.05 ] [ Today’s Date ] [ Instructor Name ]</a:t>
-            </a:r>
+              <a:t>Summarize notes for notebook check tomorrow.</a:t>
+            </a:r>
+          </a:p>
+          <a:p>
+            <a:pPr marL="0" indent="0">
+              <a:buNone/>
+            </a:pPr>
+            <a:endParaRPr lang="en-US" dirty="0"/>
+          </a:p>
+          <a:p>
+            <a:pPr marL="0" indent="0">
+              <a:buNone/>
+            </a:pPr>
+            <a:endParaRPr lang="en-US" dirty="0"/>
           </a:p>
         </p:txBody>
       </p:sp>
     </p:spTree>
     <p:extLst>
       <p:ext uri="{BB962C8B-B14F-4D97-AF65-F5344CB8AC3E}">
-        <p14:creationId xmlns:p14="http://schemas.microsoft.com/office/powerpoint/2010/main" val="2537577842"/>
+        <p14:creationId xmlns:p14="http://schemas.microsoft.com/office/powerpoint/2010/main" val="357095890"/>
       </p:ext>
     </p:extLst>
   </p:cSld>
@@ -11049,7 +11016,7 @@
             <a:spLocks noGrp="1"/>
           </p:cNvSpPr>
           <p:nvPr>
-            <p:ph type="title"/>
+            <p:ph type="ctrTitle"/>
           </p:nvPr>
         </p:nvSpPr>
         <p:spPr/>
@@ -11059,19 +11026,19 @@
           <a:p>
             <a:r>
               <a:rPr lang="en-US" dirty="0"/>
-              <a:t>Today’s plan:</a:t>
-            </a:r>
-          </a:p>
-        </p:txBody>
-      </p:sp>
-      <p:sp>
-        <p:nvSpPr>
-          <p:cNvPr id="3" name="Content Placeholder 2"/>
-          <p:cNvSpPr>
-            <a:spLocks noGrp="1"/>
-          </p:cNvSpPr>
-          <p:nvPr>
-            <p:ph idx="1"/>
+              <a:t>Finding and Fixing Errors</a:t>
+            </a:r>
+          </a:p>
+        </p:txBody>
+      </p:sp>
+      <p:sp>
+        <p:nvSpPr>
+          <p:cNvPr id="3" name="Subtitle 2"/>
+          <p:cNvSpPr>
+            <a:spLocks noGrp="1"/>
+          </p:cNvSpPr>
+          <p:nvPr>
+            <p:ph type="subTitle" idx="1"/>
           </p:nvPr>
         </p:nvSpPr>
         <p:spPr/>
@@ -11079,52 +11046,17 @@
           <a:bodyPr/>
           <a:lstStyle/>
           <a:p>
-            <a:pPr marL="0" indent="0">
-              <a:buNone/>
-            </a:pPr>
             <a:r>
               <a:rPr lang="en-US" dirty="0"/>
-              <a:t>Error check and resubmit all chapter 12 assignments.</a:t>
-            </a:r>
-          </a:p>
-          <a:p>
-            <a:endParaRPr lang="en-US" dirty="0"/>
-          </a:p>
-          <a:p>
-            <a:pPr marL="0" indent="0">
-              <a:buNone/>
-            </a:pPr>
-            <a:r>
-              <a:rPr lang="en-US" dirty="0"/>
-              <a:t>Study for the test by:</a:t>
-            </a:r>
-          </a:p>
-          <a:p>
-            <a:pPr lvl="1"/>
-            <a:r>
-              <a:rPr lang="en-US" dirty="0"/>
-              <a:t>Reviewing all of the blue, self-check pages at the end of Chapter 9.</a:t>
-            </a:r>
-          </a:p>
-          <a:p>
-            <a:pPr lvl="1"/>
-            <a:r>
-              <a:rPr lang="en-US" dirty="0"/>
-              <a:t>Re-reading sections as needed to complete the self-check problems.</a:t>
-            </a:r>
-          </a:p>
-          <a:p>
-            <a:pPr marL="457200" lvl="1" indent="0">
-              <a:buNone/>
-            </a:pPr>
-            <a:endParaRPr lang="en-US" dirty="0"/>
+              <a:t>[ 8.05 ] [ Today’s Date ] [ Instructor Name ]</a:t>
+            </a:r>
           </a:p>
         </p:txBody>
       </p:sp>
     </p:spTree>
     <p:extLst>
       <p:ext uri="{BB962C8B-B14F-4D97-AF65-F5344CB8AC3E}">
-        <p14:creationId xmlns:p14="http://schemas.microsoft.com/office/powerpoint/2010/main" val="2923220969"/>
+        <p14:creationId xmlns:p14="http://schemas.microsoft.com/office/powerpoint/2010/main" val="2537577842"/>
       </p:ext>
     </p:extLst>
   </p:cSld>
@@ -11168,7 +11100,7 @@
           <a:p>
             <a:r>
               <a:rPr lang="en-US" dirty="0"/>
-              <a:t>Homework Regrade/Resubmit</a:t>
+              <a:t>Today’s plan:</a:t>
             </a:r>
           </a:p>
         </p:txBody>
@@ -11193,7 +11125,7 @@
             </a:pPr>
             <a:r>
               <a:rPr lang="en-US" dirty="0"/>
-              <a:t>You all have the opportunity to get full credit  on your homework grades by correcting them now, in class.</a:t>
+              <a:t>Error check and resubmit all chapter 12 assignments.</a:t>
             </a:r>
           </a:p>
           <a:p>
@@ -11205,11 +11137,25 @@
             </a:pPr>
             <a:r>
               <a:rPr lang="en-US" dirty="0"/>
-              <a:t>Use your error checking algorithm, and if you need help just ask!</a:t>
-            </a:r>
-          </a:p>
-          <a:p>
-            <a:pPr marL="0" indent="0">
+              <a:t>Study for the test by:</a:t>
+            </a:r>
+          </a:p>
+          <a:p>
+            <a:pPr lvl="1"/>
+            <a:r>
+              <a:rPr lang="en-US" dirty="0"/>
+              <a:t>Reviewing all of the blue, self-check pages at the end of Chapter 9.</a:t>
+            </a:r>
+          </a:p>
+          <a:p>
+            <a:pPr lvl="1"/>
+            <a:r>
+              <a:rPr lang="en-US" dirty="0"/>
+              <a:t>Re-reading sections as needed to complete the self-check problems.</a:t>
+            </a:r>
+          </a:p>
+          <a:p>
+            <a:pPr marL="457200" lvl="1" indent="0">
               <a:buNone/>
             </a:pPr>
             <a:endParaRPr lang="en-US" dirty="0"/>
@@ -11219,7 +11165,7 @@
     </p:spTree>
     <p:extLst>
       <p:ext uri="{BB962C8B-B14F-4D97-AF65-F5344CB8AC3E}">
-        <p14:creationId xmlns:p14="http://schemas.microsoft.com/office/powerpoint/2010/main" val="2306197850"/>
+        <p14:creationId xmlns:p14="http://schemas.microsoft.com/office/powerpoint/2010/main" val="2923220969"/>
       </p:ext>
     </p:extLst>
   </p:cSld>
@@ -11263,7 +11209,7 @@
           <a:p>
             <a:r>
               <a:rPr lang="en-US" dirty="0"/>
-              <a:t>Homework</a:t>
+              <a:t>Homework Regrade/Resubmit</a:t>
             </a:r>
           </a:p>
         </p:txBody>
@@ -11283,9 +11229,24 @@
           <a:bodyPr/>
           <a:lstStyle/>
           <a:p>
+            <a:pPr marL="0" indent="0">
+              <a:buNone/>
+            </a:pPr>
             <a:r>
               <a:rPr lang="en-US" dirty="0"/>
-              <a:t>Begin reviewing chapter 12 for the quiz.</a:t>
+              <a:t>You all have the opportunity to get full credit  on your homework grades by correcting them now, in class.</a:t>
+            </a:r>
+          </a:p>
+          <a:p>
+            <a:endParaRPr lang="en-US" dirty="0"/>
+          </a:p>
+          <a:p>
+            <a:pPr marL="0" indent="0">
+              <a:buNone/>
+            </a:pPr>
+            <a:r>
+              <a:rPr lang="en-US" dirty="0"/>
+              <a:t>Use your error checking algorithm, and if you need help just ask!</a:t>
             </a:r>
           </a:p>
           <a:p>
@@ -11299,7 +11260,7 @@
     </p:spTree>
     <p:extLst>
       <p:ext uri="{BB962C8B-B14F-4D97-AF65-F5344CB8AC3E}">
-        <p14:creationId xmlns:p14="http://schemas.microsoft.com/office/powerpoint/2010/main" val="318729055"/>
+        <p14:creationId xmlns:p14="http://schemas.microsoft.com/office/powerpoint/2010/main" val="2306197850"/>
       </p:ext>
     </p:extLst>
   </p:cSld>
@@ -11333,31 +11294,29 @@
             <a:spLocks noGrp="1"/>
           </p:cNvSpPr>
           <p:nvPr>
-            <p:ph type="ctrTitle"/>
+            <p:ph type="title"/>
           </p:nvPr>
         </p:nvSpPr>
         <p:spPr/>
         <p:txBody>
-          <a:bodyPr>
-            <a:normAutofit/>
-          </a:bodyPr>
-          <a:lstStyle/>
-          <a:p>
-            <a:r>
-              <a:rPr lang="en-US" sz="4800" dirty="0"/>
-              <a:t>Review and Quiz</a:t>
-            </a:r>
-          </a:p>
-        </p:txBody>
-      </p:sp>
-      <p:sp>
-        <p:nvSpPr>
-          <p:cNvPr id="3" name="Subtitle 2"/>
-          <p:cNvSpPr>
-            <a:spLocks noGrp="1"/>
-          </p:cNvSpPr>
-          <p:nvPr>
-            <p:ph type="subTitle" idx="1"/>
+          <a:bodyPr/>
+          <a:lstStyle/>
+          <a:p>
+            <a:r>
+              <a:rPr lang="en-US" dirty="0"/>
+              <a:t>Homework</a:t>
+            </a:r>
+          </a:p>
+        </p:txBody>
+      </p:sp>
+      <p:sp>
+        <p:nvSpPr>
+          <p:cNvPr id="3" name="Content Placeholder 2"/>
+          <p:cNvSpPr>
+            <a:spLocks noGrp="1"/>
+          </p:cNvSpPr>
+          <p:nvPr>
+            <p:ph idx="1"/>
           </p:nvPr>
         </p:nvSpPr>
         <p:spPr/>
@@ -11367,15 +11326,21 @@
           <a:p>
             <a:r>
               <a:rPr lang="en-US" dirty="0"/>
-              <a:t>[ 8.06/7 ] [ Today’s Date ] [ Instructor Name ]</a:t>
-            </a:r>
+              <a:t>Begin reviewing chapter 12 for the quiz.</a:t>
+            </a:r>
+          </a:p>
+          <a:p>
+            <a:pPr marL="0" indent="0">
+              <a:buNone/>
+            </a:pPr>
+            <a:endParaRPr lang="en-US" dirty="0"/>
           </a:p>
         </p:txBody>
       </p:sp>
     </p:spTree>
     <p:extLst>
       <p:ext uri="{BB962C8B-B14F-4D97-AF65-F5344CB8AC3E}">
-        <p14:creationId xmlns:p14="http://schemas.microsoft.com/office/powerpoint/2010/main" val="3054122416"/>
+        <p14:creationId xmlns:p14="http://schemas.microsoft.com/office/powerpoint/2010/main" val="318729055"/>
       </p:ext>
     </p:extLst>
   </p:cSld>
@@ -11404,7 +11369,7 @@
       </p:grpSpPr>
       <p:sp>
         <p:nvSpPr>
-          <p:cNvPr id="4" name="Title 3"/>
+          <p:cNvPr id="2" name="Title 1"/>
           <p:cNvSpPr>
             <a:spLocks noGrp="1"/>
           </p:cNvSpPr>
@@ -11412,12 +11377,7 @@
             <p:ph type="ctrTitle"/>
           </p:nvPr>
         </p:nvSpPr>
-        <p:spPr>
-          <a:xfrm>
-            <a:off x="1524000" y="1374151"/>
-            <a:ext cx="9144000" cy="2387600"/>
-          </a:xfrm>
-        </p:spPr>
+        <p:spPr/>
         <p:txBody>
           <a:bodyPr>
             <a:normAutofit/>
@@ -11425,8 +11385,30 @@
           <a:lstStyle/>
           <a:p>
             <a:r>
-              <a:rPr lang="en-US" sz="5000" dirty="0"/>
-              <a:t>What’s on the test?</a:t>
+              <a:rPr lang="en-US" sz="4800" dirty="0"/>
+              <a:t>Review and Quiz</a:t>
+            </a:r>
+          </a:p>
+        </p:txBody>
+      </p:sp>
+      <p:sp>
+        <p:nvSpPr>
+          <p:cNvPr id="3" name="Subtitle 2"/>
+          <p:cNvSpPr>
+            <a:spLocks noGrp="1"/>
+          </p:cNvSpPr>
+          <p:nvPr>
+            <p:ph type="subTitle" idx="1"/>
+          </p:nvPr>
+        </p:nvSpPr>
+        <p:spPr/>
+        <p:txBody>
+          <a:bodyPr/>
+          <a:lstStyle/>
+          <a:p>
+            <a:r>
+              <a:rPr lang="en-US" dirty="0"/>
+              <a:t>[ 8.06/7 ] [ Today’s Date ] [ Instructor Name ]</a:t>
             </a:r>
           </a:p>
         </p:txBody>
@@ -11434,7 +11416,7 @@
     </p:spTree>
     <p:extLst>
       <p:ext uri="{BB962C8B-B14F-4D97-AF65-F5344CB8AC3E}">
-        <p14:creationId xmlns:p14="http://schemas.microsoft.com/office/powerpoint/2010/main" val="1440905957"/>
+        <p14:creationId xmlns:p14="http://schemas.microsoft.com/office/powerpoint/2010/main" val="3054122416"/>
       </p:ext>
     </p:extLst>
   </p:cSld>
@@ -11463,62 +11445,29 @@
       </p:grpSpPr>
       <p:sp>
         <p:nvSpPr>
-          <p:cNvPr id="2" name="Title 1"/>
-          <p:cNvSpPr>
-            <a:spLocks noGrp="1"/>
-          </p:cNvSpPr>
-          <p:nvPr>
-            <p:ph type="title"/>
-          </p:nvPr>
-        </p:nvSpPr>
-        <p:spPr/>
-        <p:txBody>
-          <a:bodyPr/>
-          <a:lstStyle/>
-          <a:p>
-            <a:r>
-              <a:rPr lang="en-US" dirty="0"/>
-              <a:t>Review Topics</a:t>
-            </a:r>
-          </a:p>
-        </p:txBody>
-      </p:sp>
-      <p:sp>
-        <p:nvSpPr>
-          <p:cNvPr id="3" name="Content Placeholder 2"/>
-          <p:cNvSpPr>
-            <a:spLocks noGrp="1"/>
-          </p:cNvSpPr>
-          <p:nvPr>
-            <p:ph idx="1"/>
-          </p:nvPr>
-        </p:nvSpPr>
-        <p:spPr/>
-        <p:txBody>
-          <a:bodyPr/>
-          <a:lstStyle/>
-          <a:p>
-            <a:pPr marL="0" indent="0">
-              <a:buNone/>
-            </a:pPr>
-            <a:r>
-              <a:rPr lang="en-US" dirty="0"/>
-              <a:t>Make a list of review topics that you feel you need to go over for the test tomorrow.</a:t>
-            </a:r>
-          </a:p>
-          <a:p>
-            <a:pPr marL="0" indent="0">
-              <a:buNone/>
-            </a:pPr>
-            <a:endParaRPr lang="en-US" dirty="0"/>
-          </a:p>
-          <a:p>
-            <a:pPr marL="0" indent="0">
-              <a:buNone/>
-            </a:pPr>
-            <a:r>
-              <a:rPr lang="en-US" dirty="0"/>
-              <a:t>For each topic, follow up by reviewing the textbook, self-check problems, and the appropriate Practice-It problems.</a:t>
+          <p:cNvPr id="4" name="Title 3"/>
+          <p:cNvSpPr>
+            <a:spLocks noGrp="1"/>
+          </p:cNvSpPr>
+          <p:nvPr>
+            <p:ph type="ctrTitle"/>
+          </p:nvPr>
+        </p:nvSpPr>
+        <p:spPr>
+          <a:xfrm>
+            <a:off x="1524000" y="1374151"/>
+            <a:ext cx="9144000" cy="2387600"/>
+          </a:xfrm>
+        </p:spPr>
+        <p:txBody>
+          <a:bodyPr>
+            <a:normAutofit/>
+          </a:bodyPr>
+          <a:lstStyle/>
+          <a:p>
+            <a:r>
+              <a:rPr lang="en-US" sz="5000" dirty="0"/>
+              <a:t>What’s on the test?</a:t>
             </a:r>
           </a:p>
         </p:txBody>
@@ -11526,7 +11475,7 @@
     </p:spTree>
     <p:extLst>
       <p:ext uri="{BB962C8B-B14F-4D97-AF65-F5344CB8AC3E}">
-        <p14:creationId xmlns:p14="http://schemas.microsoft.com/office/powerpoint/2010/main" val="3119596126"/>
+        <p14:creationId xmlns:p14="http://schemas.microsoft.com/office/powerpoint/2010/main" val="1440905957"/>
       </p:ext>
     </p:extLst>
   </p:cSld>
@@ -11620,6 +11569,98 @@
             <a:spLocks noGrp="1"/>
           </p:cNvSpPr>
           <p:nvPr>
+            <p:ph type="title"/>
+          </p:nvPr>
+        </p:nvSpPr>
+        <p:spPr/>
+        <p:txBody>
+          <a:bodyPr/>
+          <a:lstStyle/>
+          <a:p>
+            <a:r>
+              <a:rPr lang="en-US" dirty="0"/>
+              <a:t>Review Topics</a:t>
+            </a:r>
+          </a:p>
+        </p:txBody>
+      </p:sp>
+      <p:sp>
+        <p:nvSpPr>
+          <p:cNvPr id="3" name="Content Placeholder 2"/>
+          <p:cNvSpPr>
+            <a:spLocks noGrp="1"/>
+          </p:cNvSpPr>
+          <p:nvPr>
+            <p:ph idx="1"/>
+          </p:nvPr>
+        </p:nvSpPr>
+        <p:spPr/>
+        <p:txBody>
+          <a:bodyPr/>
+          <a:lstStyle/>
+          <a:p>
+            <a:pPr marL="0" indent="0">
+              <a:buNone/>
+            </a:pPr>
+            <a:r>
+              <a:rPr lang="en-US" dirty="0"/>
+              <a:t>Make a list of review topics that you feel you need to go over for the test tomorrow.</a:t>
+            </a:r>
+          </a:p>
+          <a:p>
+            <a:pPr marL="0" indent="0">
+              <a:buNone/>
+            </a:pPr>
+            <a:endParaRPr lang="en-US" dirty="0"/>
+          </a:p>
+          <a:p>
+            <a:pPr marL="0" indent="0">
+              <a:buNone/>
+            </a:pPr>
+            <a:r>
+              <a:rPr lang="en-US" dirty="0"/>
+              <a:t>For each topic, follow up by reviewing the textbook, self-check problems, and the appropriate Practice-It problems.</a:t>
+            </a:r>
+          </a:p>
+        </p:txBody>
+      </p:sp>
+    </p:spTree>
+    <p:extLst>
+      <p:ext uri="{BB962C8B-B14F-4D97-AF65-F5344CB8AC3E}">
+        <p14:creationId xmlns:p14="http://schemas.microsoft.com/office/powerpoint/2010/main" val="3119596126"/>
+      </p:ext>
+    </p:extLst>
+  </p:cSld>
+  <p:clrMapOvr>
+    <a:masterClrMapping/>
+  </p:clrMapOvr>
+</p:sld>
+</file>
+
+<file path=ppt/slides/slide61.xml><?xml version="1.0" encoding="utf-8"?>
+<p:sld xmlns:a="http://schemas.openxmlformats.org/drawingml/2006/main" xmlns:r="http://schemas.openxmlformats.org/officeDocument/2006/relationships" xmlns:p="http://schemas.openxmlformats.org/presentationml/2006/main">
+  <p:cSld>
+    <p:spTree>
+      <p:nvGrpSpPr>
+        <p:cNvPr id="1" name=""/>
+        <p:cNvGrpSpPr/>
+        <p:nvPr/>
+      </p:nvGrpSpPr>
+      <p:grpSpPr>
+        <a:xfrm>
+          <a:off x="0" y="0"/>
+          <a:ext cx="0" cy="0"/>
+          <a:chOff x="0" y="0"/>
+          <a:chExt cx="0" cy="0"/>
+        </a:xfrm>
+      </p:grpSpPr>
+      <p:sp>
+        <p:nvSpPr>
+          <p:cNvPr id="2" name="Title 1"/>
+          <p:cNvSpPr>
+            <a:spLocks noGrp="1"/>
+          </p:cNvSpPr>
+          <p:nvPr>
             <p:ph type="ctrTitle"/>
           </p:nvPr>
         </p:nvSpPr>
@@ -11655,7 +11696,7 @@
 </p:sld>
 </file>
 
-<file path=ppt/slides/slide61.xml><?xml version="1.0" encoding="utf-8"?>
+<file path=ppt/slides/slide62.xml><?xml version="1.0" encoding="utf-8"?>
 <p:sld xmlns:a="http://schemas.openxmlformats.org/drawingml/2006/main" xmlns:r="http://schemas.openxmlformats.org/officeDocument/2006/relationships" xmlns:p="http://schemas.openxmlformats.org/presentationml/2006/main">
   <p:cSld>
     <p:spTree>

</xml_diff>